<commit_message>
Last update, exam finished
</commit_message>
<xml_diff>
--- a/presentation/sc_project_presentation.pptx
+++ b/presentation/sc_project_presentation.pptx
@@ -236,7 +236,7 @@
           <a:p>
             <a:fld id="{00472BE3-30AD-44B6-9AE4-B99D5977AD3D}" type="datetimeFigureOut">
               <a:rPr lang="it-IT" smtClean="0"/>
-              <a:t>28/06/2018</a:t>
+              <a:t>29/06/2018</a:t>
             </a:fld>
             <a:endParaRPr lang="it-IT"/>
           </a:p>
@@ -1718,7 +1718,7 @@
           <a:p>
             <a:fld id="{71D578BD-D5EC-4F5E-BAA0-C9A897EEFD5B}" type="datetimeFigureOut">
               <a:rPr lang="it-IT" smtClean="0"/>
-              <a:t>28/06/2018</a:t>
+              <a:t>29/06/2018</a:t>
             </a:fld>
             <a:endParaRPr lang="it-IT"/>
           </a:p>
@@ -1886,7 +1886,7 @@
           <a:p>
             <a:fld id="{71D578BD-D5EC-4F5E-BAA0-C9A897EEFD5B}" type="datetimeFigureOut">
               <a:rPr lang="it-IT" smtClean="0"/>
-              <a:t>28/06/2018</a:t>
+              <a:t>29/06/2018</a:t>
             </a:fld>
             <a:endParaRPr lang="it-IT"/>
           </a:p>
@@ -2131,7 +2131,7 @@
           <a:p>
             <a:fld id="{71D578BD-D5EC-4F5E-BAA0-C9A897EEFD5B}" type="datetimeFigureOut">
               <a:rPr lang="it-IT" smtClean="0"/>
-              <a:t>28/06/2018</a:t>
+              <a:t>29/06/2018</a:t>
             </a:fld>
             <a:endParaRPr lang="it-IT"/>
           </a:p>
@@ -2360,7 +2360,7 @@
           <a:p>
             <a:fld id="{71D578BD-D5EC-4F5E-BAA0-C9A897EEFD5B}" type="datetimeFigureOut">
               <a:rPr lang="it-IT" smtClean="0"/>
-              <a:t>28/06/2018</a:t>
+              <a:t>29/06/2018</a:t>
             </a:fld>
             <a:endParaRPr lang="it-IT"/>
           </a:p>
@@ -2724,7 +2724,7 @@
           <a:p>
             <a:fld id="{71D578BD-D5EC-4F5E-BAA0-C9A897EEFD5B}" type="datetimeFigureOut">
               <a:rPr lang="it-IT" smtClean="0"/>
-              <a:t>28/06/2018</a:t>
+              <a:t>29/06/2018</a:t>
             </a:fld>
             <a:endParaRPr lang="it-IT"/>
           </a:p>
@@ -2841,7 +2841,7 @@
           <a:p>
             <a:fld id="{71D578BD-D5EC-4F5E-BAA0-C9A897EEFD5B}" type="datetimeFigureOut">
               <a:rPr lang="it-IT" smtClean="0"/>
-              <a:t>28/06/2018</a:t>
+              <a:t>29/06/2018</a:t>
             </a:fld>
             <a:endParaRPr lang="it-IT"/>
           </a:p>
@@ -2936,7 +2936,7 @@
           <a:p>
             <a:fld id="{71D578BD-D5EC-4F5E-BAA0-C9A897EEFD5B}" type="datetimeFigureOut">
               <a:rPr lang="it-IT" smtClean="0"/>
-              <a:t>28/06/2018</a:t>
+              <a:t>29/06/2018</a:t>
             </a:fld>
             <a:endParaRPr lang="it-IT"/>
           </a:p>
@@ -3314,7 +3314,7 @@
           <a:p>
             <a:fld id="{71D578BD-D5EC-4F5E-BAA0-C9A897EEFD5B}" type="datetimeFigureOut">
               <a:rPr lang="it-IT" smtClean="0"/>
-              <a:t>28/06/2018</a:t>
+              <a:t>29/06/2018</a:t>
             </a:fld>
             <a:endParaRPr lang="it-IT"/>
           </a:p>
@@ -3566,7 +3566,7 @@
           <a:p>
             <a:fld id="{71D578BD-D5EC-4F5E-BAA0-C9A897EEFD5B}" type="datetimeFigureOut">
               <a:rPr lang="it-IT" smtClean="0"/>
-              <a:t>28/06/2018</a:t>
+              <a:t>29/06/2018</a:t>
             </a:fld>
             <a:endParaRPr lang="it-IT"/>
           </a:p>
@@ -3734,7 +3734,7 @@
           <a:p>
             <a:fld id="{71D578BD-D5EC-4F5E-BAA0-C9A897EEFD5B}" type="datetimeFigureOut">
               <a:rPr lang="it-IT" smtClean="0"/>
-              <a:t>28/06/2018</a:t>
+              <a:t>29/06/2018</a:t>
             </a:fld>
             <a:endParaRPr lang="it-IT"/>
           </a:p>
@@ -3912,7 +3912,7 @@
           <a:p>
             <a:fld id="{71D578BD-D5EC-4F5E-BAA0-C9A897EEFD5B}" type="datetimeFigureOut">
               <a:rPr lang="it-IT" smtClean="0"/>
-              <a:t>28/06/2018</a:t>
+              <a:t>29/06/2018</a:t>
             </a:fld>
             <a:endParaRPr lang="it-IT"/>
           </a:p>
@@ -6409,7 +6409,7 @@
           <a:p>
             <a:fld id="{71D578BD-D5EC-4F5E-BAA0-C9A897EEFD5B}" type="datetimeFigureOut">
               <a:rPr lang="it-IT" smtClean="0"/>
-              <a:t>28/06/2018</a:t>
+              <a:t>29/06/2018</a:t>
             </a:fld>
             <a:endParaRPr lang="it-IT"/>
           </a:p>
@@ -7122,7 +7122,7 @@
           <a:graphicData uri="http://schemas.openxmlformats.org/presentationml/2006/ole">
             <mc:AlternateContent xmlns:mc="http://schemas.openxmlformats.org/markup-compatibility/2006">
               <mc:Choice xmlns:v="urn:schemas-microsoft-com:vml" Requires="v">
-                <p:oleObj spid="_x0000_s1040" name="Acrobat Document" r:id="rId3" imgW="6096000" imgH="2895323" progId="Acrobat.Document.DC">
+                <p:oleObj spid="_x0000_s1042" name="Acrobat Document" r:id="rId3" imgW="6096000" imgH="2895323" progId="Acrobat.Document.DC">
                   <p:embed/>
                 </p:oleObj>
               </mc:Choice>
@@ -7247,7 +7247,7 @@
           <a:graphicData uri="http://schemas.openxmlformats.org/presentationml/2006/ole">
             <mc:AlternateContent xmlns:mc="http://schemas.openxmlformats.org/markup-compatibility/2006">
               <mc:Choice xmlns:v="urn:schemas-microsoft-com:vml" Requires="v">
-                <p:oleObj spid="_x0000_s2064" name="Acrobat Document" r:id="rId3" imgW="6096000" imgH="2895323" progId="Acrobat.Document.DC">
+                <p:oleObj spid="_x0000_s2066" name="Acrobat Document" r:id="rId3" imgW="6096000" imgH="2895323" progId="Acrobat.Document.DC">
                   <p:embed/>
                 </p:oleObj>
               </mc:Choice>
@@ -7492,7 +7492,7 @@
           <a:graphicData uri="http://schemas.openxmlformats.org/presentationml/2006/ole">
             <mc:AlternateContent xmlns:mc="http://schemas.openxmlformats.org/markup-compatibility/2006">
               <mc:Choice xmlns:v="urn:schemas-microsoft-com:vml" Requires="v">
-                <p:oleObj spid="_x0000_s3089" name="Acrobat Document" r:id="rId3" imgW="6096000" imgH="2895323" progId="Acrobat.Document.DC">
+                <p:oleObj spid="_x0000_s3091" name="Acrobat Document" r:id="rId3" imgW="6096000" imgH="2895323" progId="Acrobat.Document.DC">
                   <p:embed/>
                 </p:oleObj>
               </mc:Choice>
@@ -7617,7 +7617,7 @@
           <a:graphicData uri="http://schemas.openxmlformats.org/presentationml/2006/ole">
             <mc:AlternateContent xmlns:mc="http://schemas.openxmlformats.org/markup-compatibility/2006">
               <mc:Choice xmlns:v="urn:schemas-microsoft-com:vml" Requires="v">
-                <p:oleObj spid="_x0000_s4112" name="Acrobat Document" r:id="rId3" imgW="6096000" imgH="2895323" progId="Acrobat.Document.DC">
+                <p:oleObj spid="_x0000_s4114" name="Acrobat Document" r:id="rId3" imgW="6096000" imgH="2895323" progId="Acrobat.Document.DC">
                   <p:embed/>
                 </p:oleObj>
               </mc:Choice>
@@ -9487,7 +9487,7 @@
         <p:spPr>
           <a:xfrm>
             <a:off x="858455" y="3010353"/>
-            <a:ext cx="3136362" cy="461665"/>
+            <a:ext cx="3494478" cy="461665"/>
           </a:xfrm>
           <a:prstGeom prst="rect">
             <a:avLst/>
@@ -9502,7 +9502,7 @@
           <a:p>
             <a:r>
               <a:rPr lang="it-IT" sz="2400" dirty="0"/>
-              <a:t>In the </a:t>
+              <a:t>With </a:t>
             </a:r>
             <a:r>
               <a:rPr lang="it-IT" sz="2400" b="1" dirty="0" err="1"/>
@@ -9513,8 +9513,12 @@
               <a:t> </a:t>
             </a:r>
             <a:r>
+              <a:rPr lang="it-IT" sz="2400" dirty="0" err="1"/>
+              <a:t>compression</a:t>
+            </a:r>
+            <a:r>
               <a:rPr lang="it-IT" sz="2400" dirty="0"/>
-              <a:t>scenario: </a:t>
+              <a:t>: </a:t>
             </a:r>
           </a:p>
         </p:txBody>
@@ -9755,7 +9759,7 @@
         <p:spPr>
           <a:xfrm>
             <a:off x="858455" y="4816452"/>
-            <a:ext cx="5107488" cy="461665"/>
+            <a:ext cx="5545108" cy="461665"/>
           </a:xfrm>
           <a:prstGeom prst="rect">
             <a:avLst/>
@@ -9770,7 +9774,7 @@
           <a:p>
             <a:r>
               <a:rPr lang="it-IT" sz="2400" dirty="0"/>
-              <a:t>In the </a:t>
+              <a:t>With </a:t>
             </a:r>
             <a:r>
               <a:rPr lang="it-IT" sz="2400" b="1" dirty="0" err="1"/>
@@ -9778,7 +9782,15 @@
             </a:r>
             <a:r>
               <a:rPr lang="it-IT" sz="2400" dirty="0"/>
-              <a:t> scenario </a:t>
+              <a:t> </a:t>
+            </a:r>
+            <a:r>
+              <a:rPr lang="it-IT" sz="2400" dirty="0" err="1"/>
+              <a:t>compression</a:t>
+            </a:r>
+            <a:r>
+              <a:rPr lang="it-IT" sz="2400" dirty="0"/>
+              <a:t> </a:t>
             </a:r>
             <a:r>
               <a:rPr lang="it-IT" sz="2400" dirty="0" err="1"/>
@@ -9807,8 +9819,8 @@
           </a:p>
         </p:txBody>
       </p:sp>
-      <mc:AlternateContent xmlns:mc="http://schemas.openxmlformats.org/markup-compatibility/2006" xmlns:a14="http://schemas.microsoft.com/office/drawing/2010/main">
-        <mc:Choice Requires="a14">
+      <mc:AlternateContent xmlns:mc="http://schemas.openxmlformats.org/markup-compatibility/2006">
+        <mc:Choice xmlns:a14="http://schemas.microsoft.com/office/drawing/2010/main" Requires="a14">
           <p:sp>
             <p:nvSpPr>
               <p:cNvPr id="21" name="CasellaDiTesto 20"/>
@@ -9817,7 +9829,7 @@
             </p:nvSpPr>
             <p:spPr>
               <a:xfrm>
-                <a:off x="6744984" y="4712011"/>
+                <a:off x="6840807" y="4699324"/>
                 <a:ext cx="1721408" cy="553998"/>
               </a:xfrm>
               <a:prstGeom prst="rect">
@@ -9884,7 +9896,7 @@
             </p:txBody>
           </p:sp>
         </mc:Choice>
-        <mc:Fallback xmlns="">
+        <mc:Fallback>
           <p:sp>
             <p:nvSpPr>
               <p:cNvPr id="21" name="CasellaDiTesto 20"/>
@@ -9895,7 +9907,7 @@
             </p:nvSpPr>
             <p:spPr>
               <a:xfrm>
-                <a:off x="6744984" y="4712011"/>
+                <a:off x="6840807" y="4699324"/>
                 <a:ext cx="1721408" cy="553998"/>
               </a:xfrm>
               <a:prstGeom prst="rect">
@@ -9931,8 +9943,8 @@
         </p:nvSpPr>
         <p:spPr>
           <a:xfrm>
-            <a:off x="6021158" y="4599845"/>
-            <a:ext cx="2918790" cy="729528"/>
+            <a:off x="6341699" y="4652074"/>
+            <a:ext cx="2527977" cy="630256"/>
           </a:xfrm>
           <a:prstGeom prst="roundRect">
             <a:avLst/>
@@ -11457,8 +11469,8 @@
           </a:p>
         </p:txBody>
       </p:sp>
-      <mc:AlternateContent xmlns:mc="http://schemas.openxmlformats.org/markup-compatibility/2006">
-        <mc:Choice xmlns:a14="http://schemas.microsoft.com/office/drawing/2010/main" Requires="a14">
+      <mc:AlternateContent xmlns:mc="http://schemas.openxmlformats.org/markup-compatibility/2006" xmlns:a14="http://schemas.microsoft.com/office/drawing/2010/main">
+        <mc:Choice Requires="a14">
           <p:sp>
             <p:nvSpPr>
               <p:cNvPr id="5" name="CasellaDiTesto 4"/>
@@ -12161,13 +12173,7 @@
                               <a:rPr lang="it-IT" sz="2000" i="1">
                                 <a:latin typeface="Cambria Math" panose="02040503050406030204" pitchFamily="18" charset="0"/>
                               </a:rPr>
-                              <m:t>−1</m:t>
-                            </m:r>
-                            <m:r>
-                              <a:rPr lang="it-IT" sz="2000" i="1">
-                                <a:latin typeface="Cambria Math" panose="02040503050406030204" pitchFamily="18" charset="0"/>
-                              </a:rPr>
-                              <m:t>)</m:t>
+                              <m:t>−1)</m:t>
                             </m:r>
                           </m:sup>
                         </m:sSubSup>
@@ -12381,7 +12387,7 @@
             </p:txBody>
           </p:sp>
         </mc:Choice>
-        <mc:Fallback>
+        <mc:Fallback xmlns="">
           <p:sp>
             <p:nvSpPr>
               <p:cNvPr id="5" name="CasellaDiTesto 4"/>
@@ -12949,8 +12955,8 @@
           </a:p>
         </p:txBody>
       </p:sp>
-      <mc:AlternateContent xmlns:mc="http://schemas.openxmlformats.org/markup-compatibility/2006">
-        <mc:Choice xmlns:a14="http://schemas.microsoft.com/office/drawing/2010/main" Requires="a14">
+      <mc:AlternateContent xmlns:mc="http://schemas.openxmlformats.org/markup-compatibility/2006" xmlns:a14="http://schemas.microsoft.com/office/drawing/2010/main">
+        <mc:Choice Requires="a14">
           <p:sp>
             <p:nvSpPr>
               <p:cNvPr id="9" name="CasellaDiTesto 8"/>
@@ -12973,6 +12979,7 @@
               </a:bodyPr>
               <a:lstStyle/>
               <a:p>
+                <a:pPr/>
                 <a14:m>
                   <m:oMathPara xmlns:m="http://schemas.openxmlformats.org/officeDocument/2006/math">
                     <m:oMathParaPr>
@@ -13062,7 +13069,7 @@
             </p:txBody>
           </p:sp>
         </mc:Choice>
-        <mc:Fallback>
+        <mc:Fallback xmlns="">
           <p:sp>
             <p:nvSpPr>
               <p:cNvPr id="9" name="CasellaDiTesto 8"/>

</xml_diff>